<commit_message>
fix a bug that only set one number in superscript format in the scripture.
</commit_message>
<xml_diff>
--- a/2023-08-16.pptx
+++ b/2023-08-16.pptx
@@ -5875,7 +5875,7 @@
               <a:rPr baseline="30000" sz="4400" b="1">
                 <a:latin typeface="方正楷体简体"/>
               </a:rPr>
-              <a:t>1</a:t>
+              <a:t>11</a:t>
             </a:r>
             <a:r>
               <a:rPr sz="4400" b="1">
@@ -5900,7 +5900,7 @@
               <a:rPr baseline="30000" sz="4400" b="1">
                 <a:latin typeface="方正楷体简体"/>
               </a:rPr>
-              <a:t>2</a:t>
+              <a:t>12</a:t>
             </a:r>
             <a:r>
               <a:rPr sz="4400" b="1">
@@ -6058,7 +6058,7 @@
               <a:rPr baseline="30000" sz="4400" b="1">
                 <a:latin typeface="方正楷体简体"/>
               </a:rPr>
-              <a:t>5</a:t>
+              <a:t>5555</a:t>
             </a:r>
             <a:r>
               <a:rPr sz="4400" b="1">

</xml_diff>

<commit_message>
possible to extract scripture from bible json file
</commit_message>
<xml_diff>
--- a/2023-08-16.pptx
+++ b/2023-08-16.pptx
@@ -5754,7 +5754,7 @@
               <a:rPr sz="7200" b="1">
                 <a:latin typeface="方正楷体简体"/>
               </a:rPr>
-              <a:t>诗篇 1篇</a:t>
+              <a:t>诗篇第1章</a:t>
             </a:r>
           </a:p>
           <a:p>
@@ -5875,13 +5875,13 @@
               <a:rPr baseline="30000" sz="4400" b="1">
                 <a:latin typeface="方正楷体简体"/>
               </a:rPr>
-              <a:t>11</a:t>
+              <a:t>1</a:t>
             </a:r>
             <a:r>
               <a:rPr sz="4400" b="1">
                 <a:latin typeface="方正楷体简体"/>
               </a:rPr>
-              <a:t>不从恶人的计谋，不站罪人的道路，不坐亵慢人的座位，</a:t>
+              <a:t>不从恶人的计谋，不站罪人的道路，不坐亵慢人的座位。</a:t>
             </a:r>
           </a:p>
           <a:p>
@@ -5900,13 +5900,13 @@
               <a:rPr baseline="30000" sz="4400" b="1">
                 <a:latin typeface="方正楷体简体"/>
               </a:rPr>
-              <a:t>12</a:t>
+              <a:t>2</a:t>
             </a:r>
             <a:r>
               <a:rPr sz="4400" b="1">
                 <a:latin typeface="方正楷体简体"/>
               </a:rPr>
-              <a:t>惟喜爱耶和华的律法，昼夜思想，这人便为有福！</a:t>
+              <a:t>惟喜爱耶和华的律法，昼夜思想，这人便为有福。</a:t>
             </a:r>
           </a:p>
           <a:p>
@@ -5931,7 +5931,7 @@
               <a:rPr sz="4400" b="1">
                 <a:latin typeface="方正楷体简体"/>
               </a:rPr>
-              <a:t>他要像一棵树栽在溪水旁，按时候结果子，叶子也不枯干。凡他所做的尽都顺利。</a:t>
+              <a:t>他要像一棵树栽在溪水旁，按时候结果子，叶子也不枯干。凡他所作的，尽都顺利。</a:t>
             </a:r>
           </a:p>
         </p:txBody>
@@ -5973,7 +5973,7 @@
               <a:rPr sz="2400" b="1">
                 <a:latin typeface="方正楷体简体"/>
               </a:rPr>
-              <a:t>诗篇 1篇</a:t>
+              <a:t>诗篇第1章</a:t>
             </a:r>
           </a:p>
         </p:txBody>
@@ -6039,7 +6039,7 @@
               <a:rPr sz="4400" b="1">
                 <a:latin typeface="方正楷体简体"/>
               </a:rPr>
-              <a:t>恶人并不是这样，乃像糠粃被风吹散。</a:t>
+              <a:t>恶人并不是这样，乃像糠秕被风吹散。</a:t>
             </a:r>
           </a:p>
           <a:p>
@@ -6058,13 +6058,13 @@
               <a:rPr baseline="30000" sz="4400" b="1">
                 <a:latin typeface="方正楷体简体"/>
               </a:rPr>
-              <a:t>5555</a:t>
+              <a:t>5</a:t>
             </a:r>
             <a:r>
               <a:rPr sz="4400" b="1">
                 <a:latin typeface="方正楷体简体"/>
               </a:rPr>
-              <a:t>因此，当审判的时候恶人必站立不住；罪人在义人的会中也是如此。</a:t>
+              <a:t>因此当审判的时候，恶人必站立不住，罪人在义人的会中，也是如此。</a:t>
             </a:r>
           </a:p>
         </p:txBody>
@@ -6106,7 +6106,7 @@
               <a:rPr sz="2400" b="1">
                 <a:latin typeface="方正楷体简体"/>
               </a:rPr>
-              <a:t>诗篇 1篇</a:t>
+              <a:t>诗篇第1章</a:t>
             </a:r>
           </a:p>
         </p:txBody>
@@ -12991,7 +12991,7 @@
               <a:rPr sz="7200" b="1">
                 <a:latin typeface="方正楷体简体"/>
               </a:rPr>
-              <a:t>以斯帖记第 7 章</a:t>
+              <a:t>以斯帖记第7章</a:t>
             </a:r>
           </a:p>
           <a:p>
@@ -13143,7 +13143,7 @@
               <a:rPr sz="4400" b="1">
                 <a:latin typeface="方正楷体简体"/>
               </a:rPr>
-              <a:t>这第二次在酒席筵前，王又问以斯帖说： “王后以斯帖啊，你要什么？我必赐给你。你求什么？就是国的一半，也必为你成就。”</a:t>
+              <a:t>这第二次在酒席筵前，王又问以斯帖说，王后以斯帖阿，你要什么，我必赐给你。你求什么，就是国的一半也必为你成就。</a:t>
             </a:r>
           </a:p>
         </p:txBody>
@@ -13185,7 +13185,7 @@
               <a:rPr sz="2400" b="1">
                 <a:latin typeface="方正楷体简体"/>
               </a:rPr>
-              <a:t>读经（以斯帖记第 7 章）</a:t>
+              <a:t>读经（以斯帖记第7章）</a:t>
             </a:r>
           </a:p>
         </p:txBody>
@@ -13251,7 +13251,7 @@
               <a:rPr sz="4400" b="1">
                 <a:latin typeface="方正楷体简体"/>
               </a:rPr>
-              <a:t>王后以斯帖回答说：“我若在王眼前蒙恩，王若以为美，我所愿的，是愿王将我的性命赐给我；我所求的，是求王将我的本族赐给我。</a:t>
+              <a:t>王后以斯帖回答说，我若在王眼前蒙恩，王若以为美，我所愿的，是愿王将我的性命赐给我。我所求的，是求王将我的本族赐给我。</a:t>
             </a:r>
           </a:p>
           <a:p>
@@ -13276,7 +13276,7 @@
               <a:rPr sz="4400" b="1">
                 <a:latin typeface="方正楷体简体"/>
               </a:rPr>
-              <a:t>因我和我的本族被卖了，要剪除杀戮灭绝我们。我们若被卖为奴为婢，我也闭口不言，但王的损失，敌人万不能补足。”</a:t>
+              <a:t>因我和我的本族被卖了，要剪除杀戮灭绝我们。我们若被卖为奴为婢，我也闭口不言。但王的损失，敌人万不能补足。</a:t>
             </a:r>
           </a:p>
         </p:txBody>
@@ -13318,7 +13318,7 @@
               <a:rPr sz="2400" b="1">
                 <a:latin typeface="方正楷体简体"/>
               </a:rPr>
-              <a:t>读经（以斯帖记第 7 章）</a:t>
+              <a:t>读经（以斯帖记第7章）</a:t>
             </a:r>
           </a:p>
         </p:txBody>
@@ -13384,7 +13384,7 @@
               <a:rPr sz="4400" b="1">
                 <a:latin typeface="方正楷体简体"/>
               </a:rPr>
-              <a:t>亚哈随鲁王问王后以斯帖说：“擅敢起意如此行的是谁？这人在哪里呢？”</a:t>
+              <a:t>亚哈随鲁王问王后以斯帖说，擅敢起意如此行的是谁。这人在哪里呢？</a:t>
             </a:r>
           </a:p>
           <a:p>
@@ -13409,7 +13409,7 @@
               <a:rPr sz="4400" b="1">
                 <a:latin typeface="方正楷体简体"/>
               </a:rPr>
-              <a:t>以斯帖说：“仇人敌人就是这恶人哈曼。”哈曼在王和王后面前就甚惊惶。</a:t>
+              <a:t>以斯帖说，仇人敌人就是这恶人哈曼。哈曼在王和王后面前就甚惊惶。</a:t>
             </a:r>
           </a:p>
         </p:txBody>
@@ -13451,7 +13451,7 @@
               <a:rPr sz="2400" b="1">
                 <a:latin typeface="方正楷体简体"/>
               </a:rPr>
-              <a:t>读经（以斯帖记第 7 章）</a:t>
+              <a:t>读经（以斯帖记第7章）</a:t>
             </a:r>
           </a:p>
         </p:txBody>
@@ -13542,7 +13542,7 @@
               <a:rPr sz="4400" b="1">
                 <a:latin typeface="方正楷体简体"/>
               </a:rPr>
-              <a:t>王从御园回到酒席之处，见哈曼伏在以斯帖所靠的榻上，王说：“他竟敢在宫内，在我面前，凌辱王后吗？ ”这话一出王口，人就蒙了哈曼的脸。</a:t>
+              <a:t>王从御园回到酒席之处，见哈曼伏在以斯帖所靠的榻上。王说，他竟敢在宫内，在我面前凌辱王后吗？这话一出王口，人就蒙了哈曼的脸。</a:t>
             </a:r>
           </a:p>
         </p:txBody>
@@ -13584,7 +13584,7 @@
               <a:rPr sz="2400" b="1">
                 <a:latin typeface="方正楷体简体"/>
               </a:rPr>
-              <a:t>读经（以斯帖记第 7 章）</a:t>
+              <a:t>读经（以斯帖记第7章）</a:t>
             </a:r>
           </a:p>
         </p:txBody>
@@ -13650,7 +13650,7 @@
               <a:rPr sz="4400" b="1">
                 <a:latin typeface="方正楷体简体"/>
               </a:rPr>
-              <a:t>伺候王的一个太监名叫哈波拿，说：“哈曼为那救王有功的末底改做了五丈高的木架，现今立在哈曼家里。”王说：“把哈曼挂在其上。”</a:t>
+              <a:t>伺候王的一个太监名叫哈波拿，说，哈曼为那救王有功的末底改做了五丈高的木架，现今立在哈曼家里。王说，把哈曼挂在其上。</a:t>
             </a:r>
           </a:p>
         </p:txBody>
@@ -13692,7 +13692,7 @@
               <a:rPr sz="2400" b="1">
                 <a:latin typeface="方正楷体简体"/>
               </a:rPr>
-              <a:t>读经（以斯帖记第 7 章）</a:t>
+              <a:t>读经（以斯帖记第7章）</a:t>
             </a:r>
           </a:p>
         </p:txBody>

</xml_diff>

<commit_message>
fix a bug due to boundary issue
</commit_message>
<xml_diff>
--- a/2023-08-16.pptx
+++ b/2023-08-16.pptx
@@ -4462,6 +4462,25 @@
               <a:t>2.随着教会人数增加，我们从2022年7月开始实行小组计划，愿加强弟兄姊妹之间彼此建造，同心追求成长。</a:t>
             </a:r>
           </a:p>
+          <a:p>
+            <a:pPr algn="l">
+              <a:lnSpc>
+                <a:spcPts val="5200"/>
+              </a:lnSpc>
+              <a:spcBef>
+                <a:spcPts val="24"/>
+              </a:spcBef>
+              <a:spcAft>
+                <a:spcPts val="0"/>
+              </a:spcAft>
+            </a:pPr>
+            <a:r>
+              <a:rPr sz="4400" b="1">
+                <a:latin typeface="FZKai-Z03S"/>
+              </a:rPr>
+              <a:t>3.感谢主，我们于2022年7月17日与慕尼黑华人教会联合崇拜，特别举行第一次的宣教主日。愿主复兴我们爱神爱人的心，同受着圣灵的感动来回应神的呼召和心意！</a:t>
+            </a:r>
+          </a:p>
         </p:txBody>
       </p:sp>
       <p:sp>
@@ -5016,6 +5035,25 @@
               <a:t>2.为德国所有的主的教会祷告、为纽伦堡教会祷告，成为一个传福音的教会、彼此相爱的、教导神话语的教会。</a:t>
             </a:r>
           </a:p>
+          <a:p>
+            <a:pPr algn="l">
+              <a:lnSpc>
+                <a:spcPts val="5200"/>
+              </a:lnSpc>
+              <a:spcBef>
+                <a:spcPts val="24"/>
+              </a:spcBef>
+              <a:spcAft>
+                <a:spcPts val="0"/>
+              </a:spcAft>
+            </a:pPr>
+            <a:r>
+              <a:rPr sz="4400" b="1">
+                <a:latin typeface="FZKai-Z03S"/>
+              </a:rPr>
+              <a:t>3.求主兴起你自己的工人，传福音的工人，传讲神话语的工人，为主摆上的工人</a:t>
+            </a:r>
+          </a:p>
         </p:txBody>
       </p:sp>
       <p:sp>
@@ -6067,6 +6105,31 @@
               <a:t>因此当审判的时候，恶人必站立不住，罪人在义人的会中，也是如此。</a:t>
             </a:r>
           </a:p>
+          <a:p>
+            <a:pPr algn="l">
+              <a:lnSpc>
+                <a:spcPts val="5200"/>
+              </a:lnSpc>
+              <a:spcBef>
+                <a:spcPts val="0"/>
+              </a:spcBef>
+              <a:spcAft>
+                <a:spcPts val="0"/>
+              </a:spcAft>
+            </a:pPr>
+            <a:r>
+              <a:rPr baseline="30000" sz="4400" b="1">
+                <a:latin typeface="方正楷体简体"/>
+              </a:rPr>
+              <a:t>6</a:t>
+            </a:r>
+            <a:r>
+              <a:rPr sz="4400" b="1">
+                <a:latin typeface="方正楷体简体"/>
+              </a:rPr>
+              <a:t>因为耶和华知道义人的道路。恶人的道路，却必灭亡。</a:t>
+            </a:r>
+          </a:p>
         </p:txBody>
       </p:sp>
       <p:sp>
@@ -13653,6 +13716,31 @@
               <a:t>伺候王的一个太监名叫哈波拿，说，哈曼为那救王有功的末底改做了五丈高的木架，现今立在哈曼家里。王说，把哈曼挂在其上。</a:t>
             </a:r>
           </a:p>
+          <a:p>
+            <a:pPr algn="l">
+              <a:lnSpc>
+                <a:spcPts val="5200"/>
+              </a:lnSpc>
+              <a:spcBef>
+                <a:spcPts val="0"/>
+              </a:spcBef>
+              <a:spcAft>
+                <a:spcPts val="0"/>
+              </a:spcAft>
+            </a:pPr>
+            <a:r>
+              <a:rPr baseline="30000" sz="4400" b="1">
+                <a:latin typeface="方正楷体简体"/>
+              </a:rPr>
+              <a:t>10</a:t>
+            </a:r>
+            <a:r>
+              <a:rPr sz="4400" b="1">
+                <a:latin typeface="方正楷体简体"/>
+              </a:rPr>
+              <a:t>于是人将哈曼挂在他为末底改所预备的木架上。王的忿怒这才止息。</a:t>
+            </a:r>
+          </a:p>
         </p:txBody>
       </p:sp>
       <p:sp>
@@ -14096,6 +14184,25 @@
               <a:t>4.为什么神要我们为他作工呢？ 神自己没有能力吗？</a:t>
             </a:r>
           </a:p>
+          <a:p>
+            <a:pPr algn="l">
+              <a:lnSpc>
+                <a:spcPts val="5200"/>
+              </a:lnSpc>
+              <a:spcBef>
+                <a:spcPts val="0"/>
+              </a:spcBef>
+              <a:spcAft>
+                <a:spcPts val="0"/>
+              </a:spcAft>
+            </a:pPr>
+            <a:r>
+              <a:rPr sz="4400" b="1">
+                <a:latin typeface="FZKai-Z03S"/>
+              </a:rPr>
+              <a:t>5.为什么面对神托付的使命时，我们总是可以找出很多借口去推搪的呢？</a:t>
+            </a:r>
+          </a:p>
         </p:txBody>
       </p:sp>
       <p:sp>
@@ -14675,6 +14782,25 @@
               <a:t>9.主人欣赏善仆的忠心和努力，他按仆人的心志与回应给予任务与权柄</a:t>
             </a:r>
           </a:p>
+          <a:p>
+            <a:pPr algn="l">
+              <a:lnSpc>
+                <a:spcPts val="5200"/>
+              </a:lnSpc>
+              <a:spcBef>
+                <a:spcPts val="0"/>
+              </a:spcBef>
+              <a:spcAft>
+                <a:spcPts val="0"/>
+              </a:spcAft>
+            </a:pPr>
+            <a:r>
+              <a:rPr sz="4400" b="1">
+                <a:latin typeface="FZKai-Z03S"/>
+              </a:rPr>
+              <a:t>10.我们对主使命的心志与回应是我们成长的指标，是不进则退的，没有可能停留不动。</a:t>
+            </a:r>
+          </a:p>
         </p:txBody>
       </p:sp>
       <p:sp>
@@ -14813,6 +14939,25 @@
                 <a:latin typeface="FZKai-Z03S"/>
               </a:rPr>
               <a:t>主人回来之前的时间还有很多吗？</a:t>
+            </a:r>
+          </a:p>
+          <a:p>
+            <a:pPr algn="l">
+              <a:lnSpc>
+                <a:spcPts val="5200"/>
+              </a:lnSpc>
+              <a:spcBef>
+                <a:spcPts val="0"/>
+              </a:spcBef>
+              <a:spcAft>
+                <a:spcPts val="0"/>
+              </a:spcAft>
+            </a:pPr>
+            <a:r>
+              <a:rPr sz="4400" b="1" i="1">
+                <a:latin typeface="FZKai-Z03S"/>
+              </a:rPr>
+              <a:t>主人回来的时候，我可以面对他而不羞愧吗？</a:t>
             </a:r>
           </a:p>
         </p:txBody>
@@ -15813,6 +15958,25 @@
                 <a:latin typeface="FZKai-Z03S"/>
               </a:rPr>
               <a:t>求　神赐福保守教会牧者们身体健康、力量充沛、出入平安。</a:t>
+            </a:r>
+          </a:p>
+          <a:p>
+            <a:pPr algn="l">
+              <a:lnSpc>
+                <a:spcPts val="5200"/>
+              </a:lnSpc>
+              <a:spcBef>
+                <a:spcPts val="24"/>
+              </a:spcBef>
+              <a:spcAft>
+                <a:spcPts val="0"/>
+              </a:spcAft>
+            </a:pPr>
+            <a:r>
+              <a:rPr sz="4400" b="1">
+                <a:latin typeface="FZKai-Z03S"/>
+              </a:rPr>
+              <a:t>为暑期出行的弟兄姊妹的脚步代祷，不论在哪里都可以经历　神的信实。</a:t>
             </a:r>
           </a:p>
         </p:txBody>

</xml_diff>